<commit_message>
added some interface feature and edited .docx to ending
</commit_message>
<xml_diff>
--- a/Kursach/Kursach.pptx
+++ b/Kursach/Kursach.pptx
@@ -112,6 +112,11 @@
       </a:defRPr>
     </a:lvl9pPr>
   </p:defaultTextStyle>
+  <p:extLst>
+    <p:ext uri="{EFAFB233-063F-42B5-8137-9DF3F51BA10A}">
+      <p15:sldGuideLst xmlns:p15="http://schemas.microsoft.com/office/powerpoint/2012/main"/>
+    </p:ext>
+  </p:extLst>
 </p:presentation>
 </file>
 
@@ -837,7 +842,7 @@
           <a:p>
             <a:fld id="{FE3C12E1-7B04-4A3C-B781-B951E54B2509}" type="datetimeFigureOut">
               <a:rPr lang="ru-RU" smtClean="0"/>
-              <a:t>17.05.2020</a:t>
+              <a:t>18.05.2020</a:t>
             </a:fld>
             <a:endParaRPr lang="ru-RU"/>
           </a:p>
@@ -1088,7 +1093,7 @@
           <a:p>
             <a:fld id="{FE3C12E1-7B04-4A3C-B781-B951E54B2509}" type="datetimeFigureOut">
               <a:rPr lang="ru-RU" smtClean="0"/>
-              <a:t>17.05.2020</a:t>
+              <a:t>18.05.2020</a:t>
             </a:fld>
             <a:endParaRPr lang="ru-RU"/>
           </a:p>
@@ -1402,7 +1407,7 @@
           <a:p>
             <a:fld id="{FE3C12E1-7B04-4A3C-B781-B951E54B2509}" type="datetimeFigureOut">
               <a:rPr lang="ru-RU" smtClean="0"/>
-              <a:t>17.05.2020</a:t>
+              <a:t>18.05.2020</a:t>
             </a:fld>
             <a:endParaRPr lang="ru-RU"/>
           </a:p>
@@ -1743,7 +1748,7 @@
           <a:p>
             <a:fld id="{FE3C12E1-7B04-4A3C-B781-B951E54B2509}" type="datetimeFigureOut">
               <a:rPr lang="ru-RU" smtClean="0"/>
-              <a:t>17.05.2020</a:t>
+              <a:t>18.05.2020</a:t>
             </a:fld>
             <a:endParaRPr lang="ru-RU"/>
           </a:p>
@@ -2057,7 +2062,7 @@
           <a:p>
             <a:fld id="{FE3C12E1-7B04-4A3C-B781-B951E54B2509}" type="datetimeFigureOut">
               <a:rPr lang="ru-RU" smtClean="0"/>
-              <a:t>17.05.2020</a:t>
+              <a:t>18.05.2020</a:t>
             </a:fld>
             <a:endParaRPr lang="ru-RU"/>
           </a:p>
@@ -2450,7 +2455,7 @@
           <a:p>
             <a:fld id="{FE3C12E1-7B04-4A3C-B781-B951E54B2509}" type="datetimeFigureOut">
               <a:rPr lang="ru-RU" smtClean="0"/>
-              <a:t>17.05.2020</a:t>
+              <a:t>18.05.2020</a:t>
             </a:fld>
             <a:endParaRPr lang="ru-RU"/>
           </a:p>
@@ -2620,7 +2625,7 @@
           <a:p>
             <a:fld id="{FE3C12E1-7B04-4A3C-B781-B951E54B2509}" type="datetimeFigureOut">
               <a:rPr lang="ru-RU" smtClean="0"/>
-              <a:t>17.05.2020</a:t>
+              <a:t>18.05.2020</a:t>
             </a:fld>
             <a:endParaRPr lang="ru-RU"/>
           </a:p>
@@ -2800,7 +2805,7 @@
           <a:p>
             <a:fld id="{FE3C12E1-7B04-4A3C-B781-B951E54B2509}" type="datetimeFigureOut">
               <a:rPr lang="ru-RU" smtClean="0"/>
-              <a:t>17.05.2020</a:t>
+              <a:t>18.05.2020</a:t>
             </a:fld>
             <a:endParaRPr lang="ru-RU"/>
           </a:p>
@@ -2976,7 +2981,7 @@
           <a:p>
             <a:fld id="{FE3C12E1-7B04-4A3C-B781-B951E54B2509}" type="datetimeFigureOut">
               <a:rPr lang="ru-RU" smtClean="0"/>
-              <a:t>17.05.2020</a:t>
+              <a:t>18.05.2020</a:t>
             </a:fld>
             <a:endParaRPr lang="ru-RU"/>
           </a:p>
@@ -3223,7 +3228,7 @@
           <a:p>
             <a:fld id="{FE3C12E1-7B04-4A3C-B781-B951E54B2509}" type="datetimeFigureOut">
               <a:rPr lang="ru-RU" smtClean="0"/>
-              <a:t>17.05.2020</a:t>
+              <a:t>18.05.2020</a:t>
             </a:fld>
             <a:endParaRPr lang="ru-RU"/>
           </a:p>
@@ -3455,7 +3460,7 @@
           <a:p>
             <a:fld id="{FE3C12E1-7B04-4A3C-B781-B951E54B2509}" type="datetimeFigureOut">
               <a:rPr lang="ru-RU" smtClean="0"/>
-              <a:t>17.05.2020</a:t>
+              <a:t>18.05.2020</a:t>
             </a:fld>
             <a:endParaRPr lang="ru-RU"/>
           </a:p>
@@ -3829,7 +3834,7 @@
           <a:p>
             <a:fld id="{FE3C12E1-7B04-4A3C-B781-B951E54B2509}" type="datetimeFigureOut">
               <a:rPr lang="ru-RU" smtClean="0"/>
-              <a:t>17.05.2020</a:t>
+              <a:t>18.05.2020</a:t>
             </a:fld>
             <a:endParaRPr lang="ru-RU"/>
           </a:p>
@@ -3952,7 +3957,7 @@
           <a:p>
             <a:fld id="{FE3C12E1-7B04-4A3C-B781-B951E54B2509}" type="datetimeFigureOut">
               <a:rPr lang="ru-RU" smtClean="0"/>
-              <a:t>17.05.2020</a:t>
+              <a:t>18.05.2020</a:t>
             </a:fld>
             <a:endParaRPr lang="ru-RU"/>
           </a:p>
@@ -4047,7 +4052,7 @@
           <a:p>
             <a:fld id="{FE3C12E1-7B04-4A3C-B781-B951E54B2509}" type="datetimeFigureOut">
               <a:rPr lang="ru-RU" smtClean="0"/>
-              <a:t>17.05.2020</a:t>
+              <a:t>18.05.2020</a:t>
             </a:fld>
             <a:endParaRPr lang="ru-RU"/>
           </a:p>
@@ -4302,7 +4307,7 @@
           <a:p>
             <a:fld id="{FE3C12E1-7B04-4A3C-B781-B951E54B2509}" type="datetimeFigureOut">
               <a:rPr lang="ru-RU" smtClean="0"/>
-              <a:t>17.05.2020</a:t>
+              <a:t>18.05.2020</a:t>
             </a:fld>
             <a:endParaRPr lang="ru-RU"/>
           </a:p>
@@ -4565,7 +4570,7 @@
           <a:p>
             <a:fld id="{FE3C12E1-7B04-4A3C-B781-B951E54B2509}" type="datetimeFigureOut">
               <a:rPr lang="ru-RU" smtClean="0"/>
-              <a:t>17.05.2020</a:t>
+              <a:t>18.05.2020</a:t>
             </a:fld>
             <a:endParaRPr lang="ru-RU"/>
           </a:p>
@@ -5308,7 +5313,7 @@
           <a:p>
             <a:fld id="{FE3C12E1-7B04-4A3C-B781-B951E54B2509}" type="datetimeFigureOut">
               <a:rPr lang="ru-RU" smtClean="0"/>
-              <a:t>17.05.2020</a:t>
+              <a:t>18.05.2020</a:t>
             </a:fld>
             <a:endParaRPr lang="ru-RU"/>
           </a:p>
@@ -8125,7 +8130,7 @@
         </p:nvSpPr>
         <p:spPr>
           <a:xfrm>
-            <a:off x="1757988" y="429492"/>
+            <a:off x="896757" y="102615"/>
             <a:ext cx="8596668" cy="1320800"/>
           </a:xfrm>
         </p:spPr>
@@ -8177,16 +8182,15 @@
           </p:cNvPicPr>
           <p:nvPr/>
         </p:nvPicPr>
-        <p:blipFill>
+        <p:blipFill rotWithShape="1">
           <a:blip r:embed="rId2"/>
-          <a:stretch>
-            <a:fillRect/>
-          </a:stretch>
+          <a:srcRect b="48176"/>
+          <a:stretch/>
         </p:blipFill>
         <p:spPr>
           <a:xfrm>
-            <a:off x="701415" y="2175163"/>
-            <a:ext cx="4082605" cy="4411090"/>
+            <a:off x="451819" y="775701"/>
+            <a:ext cx="4082605" cy="2286001"/>
           </a:xfrm>
           <a:prstGeom prst="rect">
             <a:avLst/>
@@ -8201,8 +8205,8 @@
         </p:nvSpPr>
         <p:spPr>
           <a:xfrm>
-            <a:off x="469233" y="1089892"/>
-            <a:ext cx="8368145" cy="677108"/>
+            <a:off x="5417391" y="687596"/>
+            <a:ext cx="4363917" cy="1231106"/>
           </a:xfrm>
           <a:prstGeom prst="rect">
             <a:avLst/>
@@ -8339,7 +8343,7 @@
         </p:blipFill>
         <p:spPr>
           <a:xfrm>
-            <a:off x="5091025" y="1922715"/>
+            <a:off x="4927841" y="2164566"/>
             <a:ext cx="4565584" cy="617285"/>
           </a:xfrm>
           <a:prstGeom prst="rect">
@@ -8363,8 +8367,56 @@
         </p:blipFill>
         <p:spPr>
           <a:xfrm>
-            <a:off x="5254208" y="3097297"/>
+            <a:off x="4927841" y="2781851"/>
             <a:ext cx="4239217" cy="857370"/>
+          </a:xfrm>
+          <a:prstGeom prst="rect">
+            <a:avLst/>
+          </a:prstGeom>
+        </p:spPr>
+      </p:pic>
+      <p:pic>
+        <p:nvPicPr>
+          <p:cNvPr id="3" name="Рисунок 2"/>
+          <p:cNvPicPr>
+            <a:picLocks noChangeAspect="1"/>
+          </p:cNvPicPr>
+          <p:nvPr/>
+        </p:nvPicPr>
+        <p:blipFill>
+          <a:blip r:embed="rId5"/>
+          <a:stretch>
+            <a:fillRect/>
+          </a:stretch>
+        </p:blipFill>
+        <p:spPr>
+          <a:xfrm>
+            <a:off x="451819" y="3061702"/>
+            <a:ext cx="3645568" cy="3671795"/>
+          </a:xfrm>
+          <a:prstGeom prst="rect">
+            <a:avLst/>
+          </a:prstGeom>
+        </p:spPr>
+      </p:pic>
+      <p:pic>
+        <p:nvPicPr>
+          <p:cNvPr id="7" name="Рисунок 6"/>
+          <p:cNvPicPr>
+            <a:picLocks noChangeAspect="1"/>
+          </p:cNvPicPr>
+          <p:nvPr/>
+        </p:nvPicPr>
+        <p:blipFill>
+          <a:blip r:embed="rId6"/>
+          <a:stretch>
+            <a:fillRect/>
+          </a:stretch>
+        </p:blipFill>
+        <p:spPr>
+          <a:xfrm>
+            <a:off x="4201914" y="3902459"/>
+            <a:ext cx="5184854" cy="2022763"/>
           </a:xfrm>
           <a:prstGeom prst="rect">
             <a:avLst/>
@@ -8991,8 +9043,8 @@
               <a:t> про </a:t>
             </a:r>
             <a:r>
-              <a:rPr lang="ru-RU" sz="2400" dirty="0" err="1" smtClean="0"/>
-              <a:t>обробкеъу</a:t>
+              <a:rPr lang="ru-RU" sz="2400" smtClean="0"/>
+              <a:t>обробку</a:t>
             </a:r>
             <a:r>
               <a:rPr lang="ru-RU" sz="2400" dirty="0" smtClean="0"/>

</xml_diff>

<commit_message>
added UI class and edited .pptx and .docx
</commit_message>
<xml_diff>
--- a/Kursach/Kursach.pptx
+++ b/Kursach/Kursach.pptx
@@ -842,7 +842,7 @@
           <a:p>
             <a:fld id="{FE3C12E1-7B04-4A3C-B781-B951E54B2509}" type="datetimeFigureOut">
               <a:rPr lang="ru-RU" smtClean="0"/>
-              <a:t>18.05.2020</a:t>
+              <a:t>21.05.2020</a:t>
             </a:fld>
             <a:endParaRPr lang="ru-RU"/>
           </a:p>
@@ -1093,7 +1093,7 @@
           <a:p>
             <a:fld id="{FE3C12E1-7B04-4A3C-B781-B951E54B2509}" type="datetimeFigureOut">
               <a:rPr lang="ru-RU" smtClean="0"/>
-              <a:t>18.05.2020</a:t>
+              <a:t>21.05.2020</a:t>
             </a:fld>
             <a:endParaRPr lang="ru-RU"/>
           </a:p>
@@ -1407,7 +1407,7 @@
           <a:p>
             <a:fld id="{FE3C12E1-7B04-4A3C-B781-B951E54B2509}" type="datetimeFigureOut">
               <a:rPr lang="ru-RU" smtClean="0"/>
-              <a:t>18.05.2020</a:t>
+              <a:t>21.05.2020</a:t>
             </a:fld>
             <a:endParaRPr lang="ru-RU"/>
           </a:p>
@@ -1748,7 +1748,7 @@
           <a:p>
             <a:fld id="{FE3C12E1-7B04-4A3C-B781-B951E54B2509}" type="datetimeFigureOut">
               <a:rPr lang="ru-RU" smtClean="0"/>
-              <a:t>18.05.2020</a:t>
+              <a:t>21.05.2020</a:t>
             </a:fld>
             <a:endParaRPr lang="ru-RU"/>
           </a:p>
@@ -2062,7 +2062,7 @@
           <a:p>
             <a:fld id="{FE3C12E1-7B04-4A3C-B781-B951E54B2509}" type="datetimeFigureOut">
               <a:rPr lang="ru-RU" smtClean="0"/>
-              <a:t>18.05.2020</a:t>
+              <a:t>21.05.2020</a:t>
             </a:fld>
             <a:endParaRPr lang="ru-RU"/>
           </a:p>
@@ -2455,7 +2455,7 @@
           <a:p>
             <a:fld id="{FE3C12E1-7B04-4A3C-B781-B951E54B2509}" type="datetimeFigureOut">
               <a:rPr lang="ru-RU" smtClean="0"/>
-              <a:t>18.05.2020</a:t>
+              <a:t>21.05.2020</a:t>
             </a:fld>
             <a:endParaRPr lang="ru-RU"/>
           </a:p>
@@ -2625,7 +2625,7 @@
           <a:p>
             <a:fld id="{FE3C12E1-7B04-4A3C-B781-B951E54B2509}" type="datetimeFigureOut">
               <a:rPr lang="ru-RU" smtClean="0"/>
-              <a:t>18.05.2020</a:t>
+              <a:t>21.05.2020</a:t>
             </a:fld>
             <a:endParaRPr lang="ru-RU"/>
           </a:p>
@@ -2805,7 +2805,7 @@
           <a:p>
             <a:fld id="{FE3C12E1-7B04-4A3C-B781-B951E54B2509}" type="datetimeFigureOut">
               <a:rPr lang="ru-RU" smtClean="0"/>
-              <a:t>18.05.2020</a:t>
+              <a:t>21.05.2020</a:t>
             </a:fld>
             <a:endParaRPr lang="ru-RU"/>
           </a:p>
@@ -2981,7 +2981,7 @@
           <a:p>
             <a:fld id="{FE3C12E1-7B04-4A3C-B781-B951E54B2509}" type="datetimeFigureOut">
               <a:rPr lang="ru-RU" smtClean="0"/>
-              <a:t>18.05.2020</a:t>
+              <a:t>21.05.2020</a:t>
             </a:fld>
             <a:endParaRPr lang="ru-RU"/>
           </a:p>
@@ -3228,7 +3228,7 @@
           <a:p>
             <a:fld id="{FE3C12E1-7B04-4A3C-B781-B951E54B2509}" type="datetimeFigureOut">
               <a:rPr lang="ru-RU" smtClean="0"/>
-              <a:t>18.05.2020</a:t>
+              <a:t>21.05.2020</a:t>
             </a:fld>
             <a:endParaRPr lang="ru-RU"/>
           </a:p>
@@ -3460,7 +3460,7 @@
           <a:p>
             <a:fld id="{FE3C12E1-7B04-4A3C-B781-B951E54B2509}" type="datetimeFigureOut">
               <a:rPr lang="ru-RU" smtClean="0"/>
-              <a:t>18.05.2020</a:t>
+              <a:t>21.05.2020</a:t>
             </a:fld>
             <a:endParaRPr lang="ru-RU"/>
           </a:p>
@@ -3834,7 +3834,7 @@
           <a:p>
             <a:fld id="{FE3C12E1-7B04-4A3C-B781-B951E54B2509}" type="datetimeFigureOut">
               <a:rPr lang="ru-RU" smtClean="0"/>
-              <a:t>18.05.2020</a:t>
+              <a:t>21.05.2020</a:t>
             </a:fld>
             <a:endParaRPr lang="ru-RU"/>
           </a:p>
@@ -3957,7 +3957,7 @@
           <a:p>
             <a:fld id="{FE3C12E1-7B04-4A3C-B781-B951E54B2509}" type="datetimeFigureOut">
               <a:rPr lang="ru-RU" smtClean="0"/>
-              <a:t>18.05.2020</a:t>
+              <a:t>21.05.2020</a:t>
             </a:fld>
             <a:endParaRPr lang="ru-RU"/>
           </a:p>
@@ -4052,7 +4052,7 @@
           <a:p>
             <a:fld id="{FE3C12E1-7B04-4A3C-B781-B951E54B2509}" type="datetimeFigureOut">
               <a:rPr lang="ru-RU" smtClean="0"/>
-              <a:t>18.05.2020</a:t>
+              <a:t>21.05.2020</a:t>
             </a:fld>
             <a:endParaRPr lang="ru-RU"/>
           </a:p>
@@ -4307,7 +4307,7 @@
           <a:p>
             <a:fld id="{FE3C12E1-7B04-4A3C-B781-B951E54B2509}" type="datetimeFigureOut">
               <a:rPr lang="ru-RU" smtClean="0"/>
-              <a:t>18.05.2020</a:t>
+              <a:t>21.05.2020</a:t>
             </a:fld>
             <a:endParaRPr lang="ru-RU"/>
           </a:p>
@@ -4570,7 +4570,7 @@
           <a:p>
             <a:fld id="{FE3C12E1-7B04-4A3C-B781-B951E54B2509}" type="datetimeFigureOut">
               <a:rPr lang="ru-RU" smtClean="0"/>
-              <a:t>18.05.2020</a:t>
+              <a:t>21.05.2020</a:t>
             </a:fld>
             <a:endParaRPr lang="ru-RU"/>
           </a:p>
@@ -5313,7 +5313,7 @@
           <a:p>
             <a:fld id="{FE3C12E1-7B04-4A3C-B781-B951E54B2509}" type="datetimeFigureOut">
               <a:rPr lang="ru-RU" smtClean="0"/>
-              <a:t>18.05.2020</a:t>
+              <a:t>21.05.2020</a:t>
             </a:fld>
             <a:endParaRPr lang="ru-RU"/>
           </a:p>
@@ -8509,343 +8509,352 @@
           </a:p>
         </p:txBody>
       </p:sp>
-      <p:grpSp>
-        <p:nvGrpSpPr>
-          <p:cNvPr id="34" name="Группа 33"/>
-          <p:cNvGrpSpPr/>
+      <p:pic>
+        <p:nvPicPr>
+          <p:cNvPr id="4" name="Рисунок 3"/>
+          <p:cNvPicPr>
+            <a:picLocks noChangeAspect="1"/>
+          </p:cNvPicPr>
           <p:nvPr/>
-        </p:nvGrpSpPr>
-        <p:grpSpPr>
+        </p:nvPicPr>
+        <p:blipFill>
+          <a:blip r:embed="rId2">
+            <a:extLst>
+              <a:ext uri="{28A0092B-C50C-407E-A947-70E740481C1C}">
+                <a14:useLocalDpi xmlns:a14="http://schemas.microsoft.com/office/drawing/2010/main" val="0"/>
+              </a:ext>
+            </a:extLst>
+          </a:blip>
+          <a:stretch>
+            <a:fillRect/>
+          </a:stretch>
+        </p:blipFill>
+        <p:spPr>
           <a:xfrm>
             <a:off x="571082" y="660399"/>
-            <a:ext cx="7509581" cy="6123443"/>
-            <a:chOff x="571082" y="660399"/>
-            <a:chExt cx="7509581" cy="6123443"/>
+            <a:ext cx="6996716" cy="5768109"/>
           </a:xfrm>
-        </p:grpSpPr>
-        <p:pic>
-          <p:nvPicPr>
-            <p:cNvPr id="4" name="Рисунок 3"/>
-            <p:cNvPicPr>
-              <a:picLocks noChangeAspect="1"/>
-            </p:cNvPicPr>
-            <p:nvPr/>
-          </p:nvPicPr>
-          <p:blipFill>
-            <a:blip r:embed="rId2">
-              <a:extLst>
-                <a:ext uri="{28A0092B-C50C-407E-A947-70E740481C1C}">
-                  <a14:useLocalDpi xmlns:a14="http://schemas.microsoft.com/office/drawing/2010/main" val="0"/>
-                </a:ext>
-              </a:extLst>
-            </a:blip>
-            <a:stretch>
-              <a:fillRect/>
-            </a:stretch>
-          </p:blipFill>
-          <p:spPr>
-            <a:xfrm>
-              <a:off x="571082" y="660399"/>
-              <a:ext cx="7381427" cy="6123443"/>
-            </a:xfrm>
-            <a:prstGeom prst="rect">
-              <a:avLst/>
-            </a:prstGeom>
-          </p:spPr>
-        </p:pic>
-        <p:sp>
-          <p:nvSpPr>
-            <p:cNvPr id="5" name="Ромб 4"/>
-            <p:cNvSpPr/>
-            <p:nvPr/>
-          </p:nvSpPr>
-          <p:spPr>
-            <a:xfrm>
-              <a:off x="6237142" y="3006076"/>
-              <a:ext cx="193964" cy="110836"/>
-            </a:xfrm>
-            <a:prstGeom prst="diamond">
-              <a:avLst/>
-            </a:prstGeom>
+          <a:prstGeom prst="rect">
+            <a:avLst/>
+          </a:prstGeom>
+        </p:spPr>
+      </p:pic>
+      <p:sp>
+        <p:nvSpPr>
+          <p:cNvPr id="5" name="Ромб 4"/>
+          <p:cNvSpPr/>
+          <p:nvPr/>
+        </p:nvSpPr>
+        <p:spPr>
+          <a:xfrm>
+            <a:off x="5941834" y="2869960"/>
+            <a:ext cx="183855" cy="104404"/>
+          </a:xfrm>
+          <a:prstGeom prst="diamond">
+            <a:avLst/>
+          </a:prstGeom>
+          <a:solidFill>
+            <a:schemeClr val="bg1"/>
+          </a:solidFill>
+          <a:ln>
             <a:solidFill>
-              <a:schemeClr val="bg1"/>
+              <a:schemeClr val="tx1"/>
             </a:solidFill>
-            <a:ln>
-              <a:solidFill>
-                <a:schemeClr val="tx1"/>
-              </a:solidFill>
-            </a:ln>
-          </p:spPr>
-          <p:style>
-            <a:lnRef idx="2">
-              <a:schemeClr val="accent1">
-                <a:shade val="50000"/>
-              </a:schemeClr>
-            </a:lnRef>
-            <a:fillRef idx="1">
-              <a:schemeClr val="accent1"/>
-            </a:fillRef>
-            <a:effectRef idx="0">
-              <a:schemeClr val="accent1"/>
-            </a:effectRef>
-            <a:fontRef idx="minor">
-              <a:schemeClr val="lt1"/>
-            </a:fontRef>
-          </p:style>
-          <p:txBody>
-            <a:bodyPr rtlCol="0" anchor="ctr"/>
-            <a:lstStyle/>
-            <a:p>
-              <a:pPr algn="ctr"/>
-              <a:endParaRPr lang="ru-RU"/>
-            </a:p>
-          </p:txBody>
-        </p:sp>
-        <p:sp>
-          <p:nvSpPr>
-            <p:cNvPr id="8" name="Ромб 7"/>
-            <p:cNvSpPr/>
-            <p:nvPr/>
-          </p:nvSpPr>
-          <p:spPr>
-            <a:xfrm>
-              <a:off x="4333874" y="2664456"/>
-              <a:ext cx="193964" cy="110836"/>
-            </a:xfrm>
-            <a:prstGeom prst="diamond">
-              <a:avLst/>
-            </a:prstGeom>
+          </a:ln>
+        </p:spPr>
+        <p:style>
+          <a:lnRef idx="2">
+            <a:schemeClr val="accent1">
+              <a:shade val="50000"/>
+            </a:schemeClr>
+          </a:lnRef>
+          <a:fillRef idx="1">
+            <a:schemeClr val="accent1"/>
+          </a:fillRef>
+          <a:effectRef idx="0">
+            <a:schemeClr val="accent1"/>
+          </a:effectRef>
+          <a:fontRef idx="minor">
+            <a:schemeClr val="lt1"/>
+          </a:fontRef>
+        </p:style>
+        <p:txBody>
+          <a:bodyPr rtlCol="0" anchor="ctr"/>
+          <a:lstStyle/>
+          <a:p>
+            <a:pPr algn="ctr"/>
+            <a:endParaRPr lang="ru-RU"/>
+          </a:p>
+        </p:txBody>
+      </p:sp>
+      <p:sp>
+        <p:nvSpPr>
+          <p:cNvPr id="8" name="Ромб 7"/>
+          <p:cNvSpPr/>
+          <p:nvPr/>
+        </p:nvSpPr>
+        <p:spPr>
+          <a:xfrm>
+            <a:off x="4137762" y="2548164"/>
+            <a:ext cx="183855" cy="104404"/>
+          </a:xfrm>
+          <a:prstGeom prst="diamond">
+            <a:avLst/>
+          </a:prstGeom>
+          <a:solidFill>
+            <a:schemeClr val="bg1"/>
+          </a:solidFill>
+          <a:ln>
             <a:solidFill>
-              <a:schemeClr val="bg1"/>
+              <a:schemeClr val="tx1"/>
             </a:solidFill>
-            <a:ln>
-              <a:solidFill>
-                <a:schemeClr val="tx1"/>
-              </a:solidFill>
-            </a:ln>
-          </p:spPr>
-          <p:style>
-            <a:lnRef idx="2">
-              <a:schemeClr val="accent1">
-                <a:shade val="50000"/>
-              </a:schemeClr>
-            </a:lnRef>
-            <a:fillRef idx="1">
-              <a:schemeClr val="accent1"/>
-            </a:fillRef>
-            <a:effectRef idx="0">
-              <a:schemeClr val="accent1"/>
-            </a:effectRef>
-            <a:fontRef idx="minor">
-              <a:schemeClr val="lt1"/>
-            </a:fontRef>
-          </p:style>
-          <p:txBody>
-            <a:bodyPr rtlCol="0" anchor="ctr"/>
-            <a:lstStyle/>
-            <a:p>
-              <a:pPr algn="ctr"/>
-              <a:endParaRPr lang="ru-RU"/>
-            </a:p>
-          </p:txBody>
-        </p:sp>
-        <p:sp>
-          <p:nvSpPr>
-            <p:cNvPr id="9" name="Ромб 8"/>
-            <p:cNvSpPr/>
-            <p:nvPr/>
-          </p:nvSpPr>
-          <p:spPr>
-            <a:xfrm>
-              <a:off x="7886699" y="2895240"/>
-              <a:ext cx="193964" cy="110836"/>
-            </a:xfrm>
-            <a:prstGeom prst="diamond">
-              <a:avLst/>
-            </a:prstGeom>
+          </a:ln>
+        </p:spPr>
+        <p:style>
+          <a:lnRef idx="2">
+            <a:schemeClr val="accent1">
+              <a:shade val="50000"/>
+            </a:schemeClr>
+          </a:lnRef>
+          <a:fillRef idx="1">
+            <a:schemeClr val="accent1"/>
+          </a:fillRef>
+          <a:effectRef idx="0">
+            <a:schemeClr val="accent1"/>
+          </a:effectRef>
+          <a:fontRef idx="minor">
+            <a:schemeClr val="lt1"/>
+          </a:fontRef>
+        </p:style>
+        <p:txBody>
+          <a:bodyPr rtlCol="0" anchor="ctr"/>
+          <a:lstStyle/>
+          <a:p>
+            <a:pPr algn="ctr"/>
+            <a:endParaRPr lang="ru-RU"/>
+          </a:p>
+        </p:txBody>
+      </p:sp>
+      <p:sp>
+        <p:nvSpPr>
+          <p:cNvPr id="9" name="Ромб 8"/>
+          <p:cNvSpPr/>
+          <p:nvPr/>
+        </p:nvSpPr>
+        <p:spPr>
+          <a:xfrm>
+            <a:off x="7505418" y="2765556"/>
+            <a:ext cx="183855" cy="104404"/>
+          </a:xfrm>
+          <a:prstGeom prst="diamond">
+            <a:avLst/>
+          </a:prstGeom>
+          <a:solidFill>
+            <a:schemeClr val="bg1"/>
+          </a:solidFill>
+          <a:ln>
             <a:solidFill>
-              <a:schemeClr val="bg1"/>
+              <a:schemeClr val="tx1"/>
             </a:solidFill>
-            <a:ln>
-              <a:solidFill>
-                <a:schemeClr val="tx1"/>
-              </a:solidFill>
-            </a:ln>
-          </p:spPr>
-          <p:style>
-            <a:lnRef idx="2">
-              <a:schemeClr val="accent1">
-                <a:shade val="50000"/>
-              </a:schemeClr>
-            </a:lnRef>
-            <a:fillRef idx="1">
-              <a:schemeClr val="accent1"/>
-            </a:fillRef>
-            <a:effectRef idx="0">
-              <a:schemeClr val="accent1"/>
-            </a:effectRef>
-            <a:fontRef idx="minor">
-              <a:schemeClr val="lt1"/>
-            </a:fontRef>
-          </p:style>
-          <p:txBody>
-            <a:bodyPr rtlCol="0" anchor="ctr"/>
-            <a:lstStyle/>
-            <a:p>
-              <a:pPr algn="ctr"/>
-              <a:endParaRPr lang="ru-RU"/>
-            </a:p>
-          </p:txBody>
-        </p:sp>
-        <p:cxnSp>
-          <p:nvCxnSpPr>
-            <p:cNvPr id="16" name="Соединительная линия уступом 15"/>
-            <p:cNvCxnSpPr>
-              <a:endCxn id="9" idx="3"/>
-            </p:cNvCxnSpPr>
-            <p:nvPr/>
-          </p:nvCxnSpPr>
-          <p:spPr>
-            <a:xfrm flipV="1">
-              <a:off x="1266825" y="2950658"/>
-              <a:ext cx="6813838" cy="3833184"/>
-            </a:xfrm>
-            <a:prstGeom prst="bentConnector3">
-              <a:avLst>
-                <a:gd name="adj1" fmla="val 103355"/>
-              </a:avLst>
-            </a:prstGeom>
-            <a:ln>
-              <a:solidFill>
-                <a:schemeClr val="tx1"/>
-              </a:solidFill>
-            </a:ln>
-          </p:spPr>
-          <p:style>
-            <a:lnRef idx="1">
-              <a:schemeClr val="accent1"/>
-            </a:lnRef>
-            <a:fillRef idx="0">
-              <a:schemeClr val="accent1"/>
-            </a:fillRef>
-            <a:effectRef idx="0">
-              <a:schemeClr val="accent1"/>
-            </a:effectRef>
-            <a:fontRef idx="minor">
+          </a:ln>
+        </p:spPr>
+        <p:style>
+          <a:lnRef idx="2">
+            <a:schemeClr val="accent1">
+              <a:shade val="50000"/>
+            </a:schemeClr>
+          </a:lnRef>
+          <a:fillRef idx="1">
+            <a:schemeClr val="accent1"/>
+          </a:fillRef>
+          <a:effectRef idx="0">
+            <a:schemeClr val="accent1"/>
+          </a:effectRef>
+          <a:fontRef idx="minor">
+            <a:schemeClr val="lt1"/>
+          </a:fontRef>
+        </p:style>
+        <p:txBody>
+          <a:bodyPr rtlCol="0" anchor="ctr"/>
+          <a:lstStyle/>
+          <a:p>
+            <a:pPr algn="ctr"/>
+            <a:endParaRPr lang="ru-RU"/>
+          </a:p>
+        </p:txBody>
+      </p:sp>
+      <p:cxnSp>
+        <p:nvCxnSpPr>
+          <p:cNvPr id="16" name="Соединительная линия уступом 15"/>
+          <p:cNvCxnSpPr>
+            <a:endCxn id="9" idx="3"/>
+          </p:cNvCxnSpPr>
+          <p:nvPr/>
+        </p:nvCxnSpPr>
+        <p:spPr>
+          <a:xfrm flipV="1">
+            <a:off x="1230564" y="2817758"/>
+            <a:ext cx="6458709" cy="3610750"/>
+          </a:xfrm>
+          <a:prstGeom prst="bentConnector3">
+            <a:avLst>
+              <a:gd name="adj1" fmla="val 103355"/>
+            </a:avLst>
+          </a:prstGeom>
+          <a:ln>
+            <a:solidFill>
               <a:schemeClr val="tx1"/>
-            </a:fontRef>
-          </p:style>
-        </p:cxnSp>
-        <p:cxnSp>
-          <p:nvCxnSpPr>
-            <p:cNvPr id="21" name="Прямая соединительная линия 20"/>
-            <p:cNvCxnSpPr/>
-            <p:nvPr/>
-          </p:nvCxnSpPr>
-          <p:spPr>
-            <a:xfrm>
-              <a:off x="1057275" y="6496050"/>
-              <a:ext cx="209550" cy="287792"/>
-            </a:xfrm>
-            <a:prstGeom prst="line">
-              <a:avLst/>
-            </a:prstGeom>
-            <a:ln>
-              <a:solidFill>
-                <a:schemeClr val="tx1"/>
-              </a:solidFill>
-            </a:ln>
-          </p:spPr>
-          <p:style>
-            <a:lnRef idx="1">
-              <a:schemeClr val="accent1"/>
-            </a:lnRef>
-            <a:fillRef idx="0">
-              <a:schemeClr val="accent1"/>
-            </a:fillRef>
-            <a:effectRef idx="0">
-              <a:schemeClr val="accent1"/>
-            </a:effectRef>
-            <a:fontRef idx="minor">
+            </a:solidFill>
+          </a:ln>
+        </p:spPr>
+        <p:style>
+          <a:lnRef idx="1">
+            <a:schemeClr val="accent1"/>
+          </a:lnRef>
+          <a:fillRef idx="0">
+            <a:schemeClr val="accent1"/>
+          </a:fillRef>
+          <a:effectRef idx="0">
+            <a:schemeClr val="accent1"/>
+          </a:effectRef>
+          <a:fontRef idx="minor">
+            <a:schemeClr val="tx1"/>
+          </a:fontRef>
+        </p:style>
+      </p:cxnSp>
+      <p:cxnSp>
+        <p:nvCxnSpPr>
+          <p:cNvPr id="21" name="Прямая соединительная линия 20"/>
+          <p:cNvCxnSpPr/>
+          <p:nvPr/>
+        </p:nvCxnSpPr>
+        <p:spPr>
+          <a:xfrm>
+            <a:off x="1031935" y="6157416"/>
+            <a:ext cx="198629" cy="271092"/>
+          </a:xfrm>
+          <a:prstGeom prst="line">
+            <a:avLst/>
+          </a:prstGeom>
+          <a:ln>
+            <a:solidFill>
               <a:schemeClr val="tx1"/>
-            </a:fontRef>
-          </p:style>
-        </p:cxnSp>
-        <p:cxnSp>
-          <p:nvCxnSpPr>
-            <p:cNvPr id="24" name="Прямая соединительная линия 23"/>
-            <p:cNvCxnSpPr>
-              <a:endCxn id="8" idx="1"/>
-            </p:cNvCxnSpPr>
-            <p:nvPr/>
-          </p:nvCxnSpPr>
-          <p:spPr>
-            <a:xfrm flipV="1">
-              <a:off x="3981450" y="2719874"/>
-              <a:ext cx="352424" cy="1271101"/>
-            </a:xfrm>
-            <a:prstGeom prst="line">
-              <a:avLst/>
-            </a:prstGeom>
-            <a:ln>
-              <a:solidFill>
-                <a:schemeClr val="tx1"/>
-              </a:solidFill>
-            </a:ln>
-          </p:spPr>
-          <p:style>
-            <a:lnRef idx="1">
-              <a:schemeClr val="accent1"/>
-            </a:lnRef>
-            <a:fillRef idx="0">
-              <a:schemeClr val="accent1"/>
-            </a:fillRef>
-            <a:effectRef idx="0">
-              <a:schemeClr val="accent1"/>
-            </a:effectRef>
-            <a:fontRef idx="minor">
+            </a:solidFill>
+          </a:ln>
+        </p:spPr>
+        <p:style>
+          <a:lnRef idx="1">
+            <a:schemeClr val="accent1"/>
+          </a:lnRef>
+          <a:fillRef idx="0">
+            <a:schemeClr val="accent1"/>
+          </a:fillRef>
+          <a:effectRef idx="0">
+            <a:schemeClr val="accent1"/>
+          </a:effectRef>
+          <a:fontRef idx="minor">
+            <a:schemeClr val="tx1"/>
+          </a:fontRef>
+        </p:style>
+      </p:cxnSp>
+      <p:cxnSp>
+        <p:nvCxnSpPr>
+          <p:cNvPr id="24" name="Прямая соединительная линия 23"/>
+          <p:cNvCxnSpPr>
+            <a:endCxn id="8" idx="1"/>
+          </p:cNvCxnSpPr>
+          <p:nvPr/>
+        </p:nvCxnSpPr>
+        <p:spPr>
+          <a:xfrm flipV="1">
+            <a:off x="3803706" y="2600366"/>
+            <a:ext cx="334056" cy="1197341"/>
+          </a:xfrm>
+          <a:prstGeom prst="line">
+            <a:avLst/>
+          </a:prstGeom>
+          <a:ln>
+            <a:solidFill>
               <a:schemeClr val="tx1"/>
-            </a:fontRef>
-          </p:style>
-        </p:cxnSp>
-        <p:cxnSp>
-          <p:nvCxnSpPr>
-            <p:cNvPr id="29" name="Прямая соединительная линия 28"/>
-            <p:cNvCxnSpPr>
-              <a:endCxn id="5" idx="1"/>
-            </p:cNvCxnSpPr>
-            <p:nvPr/>
-          </p:nvCxnSpPr>
-          <p:spPr>
-            <a:xfrm flipV="1">
-              <a:off x="5953125" y="3061494"/>
-              <a:ext cx="284017" cy="1234282"/>
-            </a:xfrm>
-            <a:prstGeom prst="line">
-              <a:avLst/>
-            </a:prstGeom>
-            <a:ln>
-              <a:solidFill>
-                <a:schemeClr val="tx1"/>
-              </a:solidFill>
-            </a:ln>
-          </p:spPr>
-          <p:style>
-            <a:lnRef idx="1">
-              <a:schemeClr val="accent1"/>
-            </a:lnRef>
-            <a:fillRef idx="0">
-              <a:schemeClr val="accent1"/>
-            </a:fillRef>
-            <a:effectRef idx="0">
-              <a:schemeClr val="accent1"/>
-            </a:effectRef>
-            <a:fontRef idx="minor">
+            </a:solidFill>
+          </a:ln>
+        </p:spPr>
+        <p:style>
+          <a:lnRef idx="1">
+            <a:schemeClr val="accent1"/>
+          </a:lnRef>
+          <a:fillRef idx="0">
+            <a:schemeClr val="accent1"/>
+          </a:fillRef>
+          <a:effectRef idx="0">
+            <a:schemeClr val="accent1"/>
+          </a:effectRef>
+          <a:fontRef idx="minor">
+            <a:schemeClr val="tx1"/>
+          </a:fontRef>
+        </p:style>
+      </p:cxnSp>
+      <p:cxnSp>
+        <p:nvCxnSpPr>
+          <p:cNvPr id="29" name="Прямая соединительная линия 28"/>
+          <p:cNvCxnSpPr>
+            <a:endCxn id="5" idx="1"/>
+          </p:cNvCxnSpPr>
+          <p:nvPr/>
+        </p:nvCxnSpPr>
+        <p:spPr>
+          <a:xfrm flipV="1">
+            <a:off x="5672620" y="2922162"/>
+            <a:ext cx="269214" cy="1162659"/>
+          </a:xfrm>
+          <a:prstGeom prst="line">
+            <a:avLst/>
+          </a:prstGeom>
+          <a:ln>
+            <a:solidFill>
               <a:schemeClr val="tx1"/>
-            </a:fontRef>
-          </p:style>
-        </p:cxnSp>
-      </p:grpSp>
+            </a:solidFill>
+          </a:ln>
+        </p:spPr>
+        <p:style>
+          <a:lnRef idx="1">
+            <a:schemeClr val="accent1"/>
+          </a:lnRef>
+          <a:fillRef idx="0">
+            <a:schemeClr val="accent1"/>
+          </a:fillRef>
+          <a:effectRef idx="0">
+            <a:schemeClr val="accent1"/>
+          </a:effectRef>
+          <a:fontRef idx="minor">
+            <a:schemeClr val="tx1"/>
+          </a:fontRef>
+        </p:style>
+      </p:cxnSp>
+      <p:pic>
+        <p:nvPicPr>
+          <p:cNvPr id="3" name="Рисунок 2"/>
+          <p:cNvPicPr>
+            <a:picLocks noChangeAspect="1"/>
+          </p:cNvPicPr>
+          <p:nvPr/>
+        </p:nvPicPr>
+        <p:blipFill>
+          <a:blip r:embed="rId3"/>
+          <a:stretch>
+            <a:fillRect/>
+          </a:stretch>
+        </p:blipFill>
+        <p:spPr>
+          <a:xfrm>
+            <a:off x="8083448" y="1290412"/>
+            <a:ext cx="1409897" cy="2848373"/>
+          </a:xfrm>
+          <a:prstGeom prst="rect">
+            <a:avLst/>
+          </a:prstGeom>
+        </p:spPr>
+      </p:pic>
     </p:spTree>
     <p:extLst>
       <p:ext uri="{BB962C8B-B14F-4D97-AF65-F5344CB8AC3E}">

</xml_diff>